<commit_message>
Fixed figure from section 17
</commit_message>
<xml_diff>
--- a/ITI/TF/Volume1/media/Figure_17.2-1.pptx
+++ b/ITI/TF/Volume1/media/Figure_17.2-1.pptx
@@ -104,6 +104,11 @@
       </a:defRPr>
     </a:lvl9pPr>
   </p:defaultTextStyle>
+  <p:extLst>
+    <p:ext uri="{EFAFB233-063F-42B5-8137-9DF3F51BA10A}">
+      <p15:sldGuideLst xmlns:p15="http://schemas.microsoft.com/office/powerpoint/2012/main"/>
+    </p:ext>
+  </p:extLst>
 </p:presentation>
 </file>
 
@@ -254,7 +259,7 @@
           <a:p>
             <a:fld id="{E9979D86-160B-D347-A5A1-BC29C64C62E7}" type="datetimeFigureOut">
               <a:rPr lang="en-US" smtClean="0"/>
-              <a:t>8/10/20</a:t>
+              <a:t>8/25/20</a:t>
             </a:fld>
             <a:endParaRPr lang="en-US"/>
           </a:p>
@@ -452,7 +457,7 @@
           <a:p>
             <a:fld id="{E9979D86-160B-D347-A5A1-BC29C64C62E7}" type="datetimeFigureOut">
               <a:rPr lang="en-US" smtClean="0"/>
-              <a:t>8/10/20</a:t>
+              <a:t>8/25/20</a:t>
             </a:fld>
             <a:endParaRPr lang="en-US"/>
           </a:p>
@@ -660,7 +665,7 @@
           <a:p>
             <a:fld id="{E9979D86-160B-D347-A5A1-BC29C64C62E7}" type="datetimeFigureOut">
               <a:rPr lang="en-US" smtClean="0"/>
-              <a:t>8/10/20</a:t>
+              <a:t>8/25/20</a:t>
             </a:fld>
             <a:endParaRPr lang="en-US"/>
           </a:p>
@@ -858,7 +863,7 @@
           <a:p>
             <a:fld id="{E9979D86-160B-D347-A5A1-BC29C64C62E7}" type="datetimeFigureOut">
               <a:rPr lang="en-US" smtClean="0"/>
-              <a:t>8/10/20</a:t>
+              <a:t>8/25/20</a:t>
             </a:fld>
             <a:endParaRPr lang="en-US"/>
           </a:p>
@@ -1133,7 +1138,7 @@
           <a:p>
             <a:fld id="{E9979D86-160B-D347-A5A1-BC29C64C62E7}" type="datetimeFigureOut">
               <a:rPr lang="en-US" smtClean="0"/>
-              <a:t>8/10/20</a:t>
+              <a:t>8/25/20</a:t>
             </a:fld>
             <a:endParaRPr lang="en-US"/>
           </a:p>
@@ -1398,7 +1403,7 @@
           <a:p>
             <a:fld id="{E9979D86-160B-D347-A5A1-BC29C64C62E7}" type="datetimeFigureOut">
               <a:rPr lang="en-US" smtClean="0"/>
-              <a:t>8/10/20</a:t>
+              <a:t>8/25/20</a:t>
             </a:fld>
             <a:endParaRPr lang="en-US"/>
           </a:p>
@@ -1810,7 +1815,7 @@
           <a:p>
             <a:fld id="{E9979D86-160B-D347-A5A1-BC29C64C62E7}" type="datetimeFigureOut">
               <a:rPr lang="en-US" smtClean="0"/>
-              <a:t>8/10/20</a:t>
+              <a:t>8/25/20</a:t>
             </a:fld>
             <a:endParaRPr lang="en-US"/>
           </a:p>
@@ -1951,7 +1956,7 @@
           <a:p>
             <a:fld id="{E9979D86-160B-D347-A5A1-BC29C64C62E7}" type="datetimeFigureOut">
               <a:rPr lang="en-US" smtClean="0"/>
-              <a:t>8/10/20</a:t>
+              <a:t>8/25/20</a:t>
             </a:fld>
             <a:endParaRPr lang="en-US"/>
           </a:p>
@@ -2064,7 +2069,7 @@
           <a:p>
             <a:fld id="{E9979D86-160B-D347-A5A1-BC29C64C62E7}" type="datetimeFigureOut">
               <a:rPr lang="en-US" smtClean="0"/>
-              <a:t>8/10/20</a:t>
+              <a:t>8/25/20</a:t>
             </a:fld>
             <a:endParaRPr lang="en-US"/>
           </a:p>
@@ -2375,7 +2380,7 @@
           <a:p>
             <a:fld id="{E9979D86-160B-D347-A5A1-BC29C64C62E7}" type="datetimeFigureOut">
               <a:rPr lang="en-US" smtClean="0"/>
-              <a:t>8/10/20</a:t>
+              <a:t>8/25/20</a:t>
             </a:fld>
             <a:endParaRPr lang="en-US"/>
           </a:p>
@@ -2663,7 +2668,7 @@
           <a:p>
             <a:fld id="{E9979D86-160B-D347-A5A1-BC29C64C62E7}" type="datetimeFigureOut">
               <a:rPr lang="en-US" smtClean="0"/>
-              <a:t>8/10/20</a:t>
+              <a:t>8/25/20</a:t>
             </a:fld>
             <a:endParaRPr lang="en-US"/>
           </a:p>
@@ -2904,7 +2909,7 @@
           <a:p>
             <a:fld id="{E9979D86-160B-D347-A5A1-BC29C64C62E7}" type="datetimeFigureOut">
               <a:rPr lang="en-US" smtClean="0"/>
-              <a:t>8/10/20</a:t>
+              <a:t>8/25/20</a:t>
             </a:fld>
             <a:endParaRPr lang="en-US"/>
           </a:p>
@@ -3390,7 +3395,7 @@
         </p:nvSpPr>
         <p:spPr bwMode="auto">
           <a:xfrm flipH="1">
-            <a:off x="3843338" y="2359025"/>
+            <a:off x="3518871" y="1857587"/>
             <a:ext cx="9525" cy="1557338"/>
           </a:xfrm>
           <a:prstGeom prst="line">
@@ -3441,8 +3446,8 @@
         </p:nvSpPr>
         <p:spPr bwMode="auto">
           <a:xfrm>
-            <a:off x="87313" y="2586038"/>
-            <a:ext cx="2106612" cy="438150"/>
+            <a:off x="-549275" y="2431653"/>
+            <a:ext cx="2106612" cy="764382"/>
           </a:xfrm>
           <a:prstGeom prst="rect">
             <a:avLst/>
@@ -3479,7 +3484,7 @@
           </a:bodyPr>
           <a:lstStyle/>
           <a:p>
-            <a:pPr marL="0" marR="0" lvl="0" indent="0" algn="l" defTabSz="914400" rtl="0" eaLnBrk="0" fontAlgn="base" latinLnBrk="0" hangingPunct="0">
+            <a:pPr marL="0" marR="0" lvl="0" indent="0" algn="r" defTabSz="914400" rtl="0" eaLnBrk="0" fontAlgn="base" latinLnBrk="0" hangingPunct="0">
               <a:lnSpc>
                 <a:spcPct val="100000"/>
               </a:lnSpc>
@@ -3496,7 +3501,7 @@
               <a:tabLst/>
             </a:pPr>
             <a:r>
-              <a:rPr kumimoji="0" lang="en-AU" altLang="en-US" sz="1000" b="0" i="0" u="none" strike="noStrike" cap="none" normalizeH="0" baseline="0">
+              <a:rPr kumimoji="0" lang="en-AU" altLang="en-US" sz="1000" b="0" i="0" u="none" strike="noStrike" cap="none" normalizeH="0" baseline="0" dirty="0">
                 <a:ln>
                   <a:noFill/>
                 </a:ln>
@@ -3504,24 +3509,15 @@
                   <a:schemeClr val="tx1"/>
                 </a:solidFill>
                 <a:effectLst/>
-                <a:latin typeface="Arial" panose="020B0604020202020204" pitchFamily="34" charset="0"/>
+                <a:latin typeface="Times New Roman" panose="02020603050405020304" pitchFamily="18" charset="0"/>
                 <a:ea typeface="Times New Roman" panose="02020603050405020304" pitchFamily="18" charset="0"/>
+                <a:cs typeface="Times New Roman" panose="02020603050405020304" pitchFamily="18" charset="0"/>
               </a:rPr>
-              <a:t>Retrieve Form [ITI-34] </a:t>
-            </a:r>
-            <a:endParaRPr kumimoji="0" lang="en-AU" altLang="en-US" sz="1000" b="0" i="0" u="none" strike="noStrike" cap="none" normalizeH="0" baseline="0">
-              <a:ln>
-                <a:noFill/>
-              </a:ln>
-              <a:solidFill>
-                <a:schemeClr val="tx1"/>
-              </a:solidFill>
-              <a:effectLst/>
-              <a:latin typeface="Arial" panose="020B0604020202020204" pitchFamily="34" charset="0"/>
-            </a:endParaRPr>
-          </a:p>
-          <a:p>
-            <a:pPr marL="0" marR="0" lvl="0" indent="0" algn="l" defTabSz="914400" rtl="0" eaLnBrk="0" fontAlgn="base" latinLnBrk="0" hangingPunct="0">
+              <a:t>Retrieve Form </a:t>
+            </a:r>
+          </a:p>
+          <a:p>
+            <a:pPr marL="0" marR="0" lvl="0" indent="0" algn="r" defTabSz="914400" rtl="0" eaLnBrk="0" fontAlgn="base" latinLnBrk="0" hangingPunct="0">
               <a:lnSpc>
                 <a:spcPct val="100000"/>
               </a:lnSpc>
@@ -3538,7 +3534,51 @@
               <a:tabLst/>
             </a:pPr>
             <a:r>
-              <a:rPr kumimoji="0" lang="en-AU" altLang="en-US" sz="1000" b="0" i="0" u="none" strike="noStrike" cap="none" normalizeH="0" baseline="0">
+              <a:rPr kumimoji="0" lang="en-AU" altLang="en-US" sz="1000" b="0" i="0" u="none" strike="noStrike" cap="none" normalizeH="0" baseline="0" dirty="0">
+                <a:ln>
+                  <a:noFill/>
+                </a:ln>
+                <a:solidFill>
+                  <a:schemeClr val="tx1"/>
+                </a:solidFill>
+                <a:effectLst/>
+                <a:latin typeface="Times New Roman" panose="02020603050405020304" pitchFamily="18" charset="0"/>
+                <a:ea typeface="Times New Roman" panose="02020603050405020304" pitchFamily="18" charset="0"/>
+                <a:cs typeface="Times New Roman" panose="02020603050405020304" pitchFamily="18" charset="0"/>
+              </a:rPr>
+              <a:t>[ITI-34] </a:t>
+            </a:r>
+            <a:endParaRPr kumimoji="0" lang="en-AU" altLang="en-US" sz="1000" b="0" i="0" u="none" strike="noStrike" cap="none" normalizeH="0" baseline="0" dirty="0">
+              <a:ln>
+                <a:noFill/>
+              </a:ln>
+              <a:solidFill>
+                <a:schemeClr val="tx1"/>
+              </a:solidFill>
+              <a:effectLst/>
+              <a:latin typeface="Times New Roman" panose="02020603050405020304" pitchFamily="18" charset="0"/>
+              <a:cs typeface="Times New Roman" panose="02020603050405020304" pitchFamily="18" charset="0"/>
+            </a:endParaRPr>
+          </a:p>
+          <a:p>
+            <a:pPr marL="0" marR="0" lvl="0" indent="0" algn="r" defTabSz="914400" rtl="0" eaLnBrk="0" fontAlgn="base" latinLnBrk="0" hangingPunct="0">
+              <a:lnSpc>
+                <a:spcPct val="100000"/>
+              </a:lnSpc>
+              <a:spcBef>
+                <a:spcPct val="0"/>
+              </a:spcBef>
+              <a:spcAft>
+                <a:spcPct val="0"/>
+              </a:spcAft>
+              <a:buClrTx/>
+              <a:buSzTx/>
+              <a:buFontTx/>
+              <a:buNone/>
+              <a:tabLst/>
+            </a:pPr>
+            <a:r>
+              <a:rPr kumimoji="0" lang="en-AU" altLang="en-US" sz="1000" b="0" i="0" u="none" strike="noStrike" cap="none" normalizeH="0" baseline="0" dirty="0">
                 <a:ln>
                   <a:noFill/>
                 </a:ln>
@@ -3571,7 +3611,7 @@
         </p:nvSpPr>
         <p:spPr bwMode="auto">
           <a:xfrm>
-            <a:off x="609600" y="3497263"/>
+            <a:off x="609600" y="3438271"/>
             <a:ext cx="1866900" cy="542925"/>
           </a:xfrm>
           <a:prstGeom prst="rect">
@@ -3613,8 +3653,37 @@
               <a:buNone/>
               <a:tabLst/>
             </a:pPr>
-            <a:r>
-              <a:rPr kumimoji="0" lang="en-AU" altLang="en-US" sz="1000" b="0" i="0" u="none" strike="noStrike" cap="none" normalizeH="0" baseline="0">
+            <a:endParaRPr kumimoji="0" lang="en-AU" altLang="en-US" sz="1000" b="0" i="0" u="none" strike="noStrike" cap="none" normalizeH="0" baseline="0" dirty="0">
+              <a:ln>
+                <a:noFill/>
+              </a:ln>
+              <a:solidFill>
+                <a:schemeClr val="tx1"/>
+              </a:solidFill>
+              <a:effectLst/>
+              <a:latin typeface="Arial" panose="020B0604020202020204" pitchFamily="34" charset="0"/>
+              <a:ea typeface="Times New Roman" panose="02020603050405020304" pitchFamily="18" charset="0"/>
+            </a:endParaRPr>
+          </a:p>
+          <a:p>
+            <a:pPr marL="0" marR="0" lvl="0" indent="0" algn="ctr" defTabSz="914400" rtl="0" eaLnBrk="0" fontAlgn="base" latinLnBrk="0" hangingPunct="0">
+              <a:lnSpc>
+                <a:spcPct val="100000"/>
+              </a:lnSpc>
+              <a:spcBef>
+                <a:spcPct val="0"/>
+              </a:spcBef>
+              <a:spcAft>
+                <a:spcPct val="0"/>
+              </a:spcAft>
+              <a:buClrTx/>
+              <a:buSzTx/>
+              <a:buFontTx/>
+              <a:buNone/>
+              <a:tabLst/>
+            </a:pPr>
+            <a:r>
+              <a:rPr kumimoji="0" lang="en-AU" altLang="en-US" sz="1000" b="0" i="0" u="none" strike="noStrike" cap="none" normalizeH="0" baseline="0" dirty="0">
                 <a:ln>
                   <a:noFill/>
                 </a:ln>
@@ -3627,7 +3696,7 @@
               </a:rPr>
               <a:t>Form Manager</a:t>
             </a:r>
-            <a:endParaRPr kumimoji="0" lang="en-AU" altLang="en-US" sz="1000" b="0" i="0" u="none" strike="noStrike" cap="none" normalizeH="0" baseline="0">
+            <a:endParaRPr kumimoji="0" lang="en-AU" altLang="en-US" sz="1000" b="0" i="0" u="none" strike="noStrike" cap="none" normalizeH="0" baseline="0" dirty="0">
               <a:ln>
                 <a:noFill/>
               </a:ln>
@@ -3655,7 +3724,7 @@
               <a:buNone/>
               <a:tabLst/>
             </a:pPr>
-            <a:endParaRPr kumimoji="0" lang="en-AU" altLang="en-US" sz="1800" b="0" i="0" u="none" strike="noStrike" cap="none" normalizeH="0" baseline="0">
+            <a:endParaRPr kumimoji="0" lang="en-AU" altLang="en-US" sz="1800" b="0" i="0" u="none" strike="noStrike" cap="none" normalizeH="0" baseline="0" dirty="0">
               <a:ln>
                 <a:noFill/>
               </a:ln>
@@ -3683,9 +3752,9 @@
           <p:nvPr/>
         </p:nvSpPr>
         <p:spPr bwMode="auto">
-          <a:xfrm flipV="1">
-            <a:off x="3951288" y="1444625"/>
-            <a:ext cx="892175" cy="9525"/>
+          <a:xfrm>
+            <a:off x="3644333" y="1519758"/>
+            <a:ext cx="1544947" cy="9003"/>
           </a:xfrm>
           <a:prstGeom prst="line">
             <a:avLst/>
@@ -3735,7 +3804,7 @@
         </p:nvSpPr>
         <p:spPr bwMode="auto">
           <a:xfrm>
-            <a:off x="4127500" y="1162050"/>
+            <a:off x="3785473" y="1273174"/>
             <a:ext cx="1487488" cy="228600"/>
           </a:xfrm>
           <a:prstGeom prst="rect">
@@ -3790,7 +3859,7 @@
               <a:tabLst/>
             </a:pPr>
             <a:r>
-              <a:rPr kumimoji="0" lang="en-AU" altLang="en-US" sz="1000" b="0" i="0" u="none" strike="noStrike" cap="none" normalizeH="0" baseline="0">
+              <a:rPr kumimoji="0" lang="en-AU" altLang="en-US" sz="1000" b="0" i="0" u="none" strike="noStrike" cap="none" normalizeH="0" baseline="0" dirty="0">
                 <a:ln>
                   <a:noFill/>
                 </a:ln>
@@ -3805,7 +3874,7 @@
               <a:t></a:t>
             </a:r>
             <a:r>
-              <a:rPr kumimoji="0" lang="en-AU" altLang="en-US" sz="1000" b="0" i="0" u="none" strike="noStrike" cap="none" normalizeH="0" baseline="0">
+              <a:rPr kumimoji="0" lang="en-AU" altLang="en-US" sz="1000" b="0" i="0" u="none" strike="noStrike" cap="none" normalizeH="0" baseline="0" dirty="0">
                 <a:ln>
                   <a:noFill/>
                 </a:ln>
@@ -3815,9 +3884,24 @@
                 <a:effectLst/>
                 <a:ea typeface="Times New Roman" panose="02020603050405020304" pitchFamily="18" charset="0"/>
               </a:rPr>
-              <a:t> Archive Form [ITI-36]</a:t>
-            </a:r>
-            <a:endParaRPr kumimoji="0" lang="en-AU" altLang="en-US" sz="1000" b="0" i="0" u="none" strike="noStrike" cap="none" normalizeH="0" baseline="0">
+              <a:t> </a:t>
+            </a:r>
+            <a:r>
+              <a:rPr kumimoji="0" lang="en-AU" altLang="en-US" sz="1000" b="0" i="0" u="none" strike="noStrike" cap="none" normalizeH="0" baseline="0" dirty="0">
+                <a:ln>
+                  <a:noFill/>
+                </a:ln>
+                <a:solidFill>
+                  <a:schemeClr val="tx1"/>
+                </a:solidFill>
+                <a:effectLst/>
+                <a:latin typeface="Times New Roman" panose="02020603050405020304" pitchFamily="18" charset="0"/>
+                <a:ea typeface="Times New Roman" panose="02020603050405020304" pitchFamily="18" charset="0"/>
+                <a:cs typeface="Times New Roman" panose="02020603050405020304" pitchFamily="18" charset="0"/>
+              </a:rPr>
+              <a:t>Archive Form [ITI-36]</a:t>
+            </a:r>
+            <a:endParaRPr kumimoji="0" lang="en-AU" altLang="en-US" sz="1000" b="0" i="0" u="none" strike="noStrike" cap="none" normalizeH="0" baseline="0" dirty="0">
               <a:ln>
                 <a:noFill/>
               </a:ln>
@@ -3827,6 +3911,7 @@
               <a:effectLst/>
               <a:latin typeface="Times New Roman" panose="02020603050405020304" pitchFamily="18" charset="0"/>
               <a:ea typeface="Times New Roman" panose="02020603050405020304" pitchFamily="18" charset="0"/>
+              <a:cs typeface="Times New Roman" panose="02020603050405020304" pitchFamily="18" charset="0"/>
               <a:sym typeface="Wingdings" pitchFamily="2" charset="2"/>
             </a:endParaRPr>
           </a:p>
@@ -3848,7 +3933,7 @@
         </p:nvSpPr>
         <p:spPr bwMode="auto">
           <a:xfrm>
-            <a:off x="2924175" y="3487738"/>
+            <a:off x="2924175" y="3428746"/>
             <a:ext cx="1866900" cy="542925"/>
           </a:xfrm>
           <a:prstGeom prst="rect">
@@ -3890,7 +3975,7 @@
               <a:buNone/>
               <a:tabLst/>
             </a:pPr>
-            <a:endParaRPr kumimoji="0" lang="en-AU" altLang="en-US" sz="1000" b="0" i="0" u="none" strike="noStrike" cap="none" normalizeH="0" baseline="0">
+            <a:endParaRPr kumimoji="0" lang="en-AU" altLang="en-US" sz="1000" b="0" i="0" u="none" strike="noStrike" cap="none" normalizeH="0" baseline="0" dirty="0">
               <a:ln>
                 <a:noFill/>
               </a:ln>
@@ -3920,7 +4005,7 @@
               <a:tabLst/>
             </a:pPr>
             <a:r>
-              <a:rPr kumimoji="0" lang="en-AU" altLang="en-US" sz="1000" b="0" i="0" u="none" strike="noStrike" cap="none" normalizeH="0" baseline="0">
+              <a:rPr kumimoji="0" lang="en-AU" altLang="en-US" sz="1000" b="0" i="0" u="none" strike="noStrike" cap="none" normalizeH="0" baseline="0" dirty="0">
                 <a:ln>
                   <a:noFill/>
                 </a:ln>
@@ -3933,7 +4018,7 @@
               </a:rPr>
               <a:t>Form Receiver</a:t>
             </a:r>
-            <a:endParaRPr kumimoji="0" lang="en-AU" altLang="en-US" sz="1000" b="0" i="0" u="none" strike="noStrike" cap="none" normalizeH="0" baseline="0">
+            <a:endParaRPr kumimoji="0" lang="en-AU" altLang="en-US" sz="1000" b="0" i="0" u="none" strike="noStrike" cap="none" normalizeH="0" baseline="0" dirty="0">
               <a:ln>
                 <a:noFill/>
               </a:ln>
@@ -3961,7 +4046,7 @@
               <a:buNone/>
               <a:tabLst/>
             </a:pPr>
-            <a:endParaRPr kumimoji="0" lang="en-AU" altLang="en-US" sz="1800" b="0" i="0" u="none" strike="noStrike" cap="none" normalizeH="0" baseline="0">
+            <a:endParaRPr kumimoji="0" lang="en-AU" altLang="en-US" sz="1800" b="0" i="0" u="none" strike="noStrike" cap="none" normalizeH="0" baseline="0" dirty="0">
               <a:ln>
                 <a:noFill/>
               </a:ln>
@@ -3990,8 +4075,8 @@
         </p:nvSpPr>
         <p:spPr bwMode="auto">
           <a:xfrm>
-            <a:off x="4838700" y="1401763"/>
-            <a:ext cx="1866900" cy="542925"/>
+            <a:off x="5180012" y="1300345"/>
+            <a:ext cx="1477962" cy="542925"/>
           </a:xfrm>
           <a:prstGeom prst="rect">
             <a:avLst/>
@@ -4032,8 +4117,37 @@
               <a:buNone/>
               <a:tabLst/>
             </a:pPr>
-            <a:r>
-              <a:rPr kumimoji="0" lang="en-AU" altLang="en-US" sz="1000" b="0" i="0" u="none" strike="noStrike" cap="none" normalizeH="0" baseline="0">
+            <a:endParaRPr kumimoji="0" lang="en-AU" altLang="en-US" sz="1000" b="0" i="0" u="none" strike="noStrike" cap="none" normalizeH="0" baseline="0" dirty="0">
+              <a:ln>
+                <a:noFill/>
+              </a:ln>
+              <a:solidFill>
+                <a:schemeClr val="tx1"/>
+              </a:solidFill>
+              <a:effectLst/>
+              <a:latin typeface="Arial" panose="020B0604020202020204" pitchFamily="34" charset="0"/>
+              <a:ea typeface="Times New Roman" panose="02020603050405020304" pitchFamily="18" charset="0"/>
+            </a:endParaRPr>
+          </a:p>
+          <a:p>
+            <a:pPr marL="0" marR="0" lvl="0" indent="0" algn="ctr" defTabSz="914400" rtl="0" eaLnBrk="0" fontAlgn="base" latinLnBrk="0" hangingPunct="0">
+              <a:lnSpc>
+                <a:spcPct val="100000"/>
+              </a:lnSpc>
+              <a:spcBef>
+                <a:spcPct val="0"/>
+              </a:spcBef>
+              <a:spcAft>
+                <a:spcPct val="0"/>
+              </a:spcAft>
+              <a:buClrTx/>
+              <a:buSzTx/>
+              <a:buFontTx/>
+              <a:buNone/>
+              <a:tabLst/>
+            </a:pPr>
+            <a:r>
+              <a:rPr kumimoji="0" lang="en-AU" altLang="en-US" sz="1000" b="0" i="0" u="none" strike="noStrike" cap="none" normalizeH="0" baseline="0" dirty="0">
                 <a:ln>
                   <a:noFill/>
                 </a:ln>
@@ -4046,7 +4160,7 @@
               </a:rPr>
               <a:t>Form Archiver</a:t>
             </a:r>
-            <a:endParaRPr kumimoji="0" lang="en-AU" altLang="en-US" sz="1000" b="0" i="0" u="none" strike="noStrike" cap="none" normalizeH="0" baseline="0">
+            <a:endParaRPr kumimoji="0" lang="en-AU" altLang="en-US" sz="1000" b="0" i="0" u="none" strike="noStrike" cap="none" normalizeH="0" baseline="0" dirty="0">
               <a:ln>
                 <a:noFill/>
               </a:ln>
@@ -4074,7 +4188,7 @@
               <a:buNone/>
               <a:tabLst/>
             </a:pPr>
-            <a:endParaRPr kumimoji="0" lang="en-AU" altLang="en-US" sz="1800" b="0" i="0" u="none" strike="noStrike" cap="none" normalizeH="0" baseline="0">
+            <a:endParaRPr kumimoji="0" lang="en-AU" altLang="en-US" sz="1800" b="0" i="0" u="none" strike="noStrike" cap="none" normalizeH="0" baseline="0" dirty="0">
               <a:ln>
                 <a:noFill/>
               </a:ln>
@@ -4944,6 +5058,676 @@
           <a:lstStyle/>
           <a:p>
             <a:endParaRPr lang="en-US"/>
+          </a:p>
+        </p:txBody>
+      </p:sp>
+      <p:sp>
+        <p:nvSpPr>
+          <p:cNvPr id="23" name="Text Box 13">
+            <a:extLst>
+              <a:ext uri="{FF2B5EF4-FFF2-40B4-BE49-F238E27FC236}">
+                <a16:creationId xmlns:a16="http://schemas.microsoft.com/office/drawing/2014/main" id="{2F048AD4-CD0C-0347-9D3E-3651CD59632D}"/>
+              </a:ext>
+            </a:extLst>
+          </p:cNvPr>
+          <p:cNvSpPr txBox="1">
+            <a:spLocks noChangeArrowheads="1"/>
+          </p:cNvSpPr>
+          <p:nvPr/>
+        </p:nvSpPr>
+        <p:spPr bwMode="auto">
+          <a:xfrm>
+            <a:off x="609599" y="1291098"/>
+            <a:ext cx="3034734" cy="542925"/>
+          </a:xfrm>
+          <a:prstGeom prst="rect">
+            <a:avLst/>
+          </a:prstGeom>
+          <a:solidFill>
+            <a:srgbClr val="FFFFFF"/>
+          </a:solidFill>
+          <a:ln w="25400">
+            <a:solidFill>
+              <a:srgbClr val="000000"/>
+            </a:solidFill>
+            <a:miter lim="800000"/>
+            <a:headEnd/>
+            <a:tailEnd/>
+          </a:ln>
+        </p:spPr>
+        <p:txBody>
+          <a:bodyPr vert="horz" wrap="square" lIns="91440" tIns="45720" rIns="91440" bIns="45720" numCol="1" anchor="t" anchorCtr="0" compatLnSpc="1">
+            <a:prstTxWarp prst="textNoShape">
+              <a:avLst/>
+            </a:prstTxWarp>
+          </a:bodyPr>
+          <a:lstStyle/>
+          <a:p>
+            <a:pPr marL="0" marR="0" lvl="0" indent="0" algn="ctr" defTabSz="914400" rtl="0" eaLnBrk="0" fontAlgn="base" latinLnBrk="0" hangingPunct="0">
+              <a:lnSpc>
+                <a:spcPct val="100000"/>
+              </a:lnSpc>
+              <a:spcBef>
+                <a:spcPct val="0"/>
+              </a:spcBef>
+              <a:spcAft>
+                <a:spcPct val="0"/>
+              </a:spcAft>
+              <a:buClrTx/>
+              <a:buSzTx/>
+              <a:buFontTx/>
+              <a:buNone/>
+              <a:tabLst/>
+            </a:pPr>
+            <a:endParaRPr kumimoji="0" lang="en-AU" altLang="en-US" sz="1000" b="0" i="0" u="none" strike="noStrike" cap="none" normalizeH="0" baseline="0" dirty="0">
+              <a:ln>
+                <a:noFill/>
+              </a:ln>
+              <a:solidFill>
+                <a:schemeClr val="tx1"/>
+              </a:solidFill>
+              <a:effectLst/>
+              <a:latin typeface="Arial" panose="020B0604020202020204" pitchFamily="34" charset="0"/>
+              <a:ea typeface="Times New Roman" panose="02020603050405020304" pitchFamily="18" charset="0"/>
+            </a:endParaRPr>
+          </a:p>
+          <a:p>
+            <a:pPr marL="0" marR="0" lvl="0" indent="0" algn="ctr" defTabSz="914400" rtl="0" eaLnBrk="0" fontAlgn="base" latinLnBrk="0" hangingPunct="0">
+              <a:lnSpc>
+                <a:spcPct val="100000"/>
+              </a:lnSpc>
+              <a:spcBef>
+                <a:spcPct val="0"/>
+              </a:spcBef>
+              <a:spcAft>
+                <a:spcPct val="0"/>
+              </a:spcAft>
+              <a:buClrTx/>
+              <a:buSzTx/>
+              <a:buFontTx/>
+              <a:buNone/>
+              <a:tabLst/>
+            </a:pPr>
+            <a:r>
+              <a:rPr kumimoji="0" lang="en-AU" altLang="en-US" sz="1000" b="0" i="0" u="none" strike="noStrike" cap="none" normalizeH="0" baseline="0" dirty="0">
+                <a:ln>
+                  <a:noFill/>
+                </a:ln>
+                <a:solidFill>
+                  <a:schemeClr val="tx1"/>
+                </a:solidFill>
+                <a:effectLst/>
+                <a:latin typeface="Arial" panose="020B0604020202020204" pitchFamily="34" charset="0"/>
+                <a:ea typeface="Times New Roman" panose="02020603050405020304" pitchFamily="18" charset="0"/>
+              </a:rPr>
+              <a:t>Form Filler</a:t>
+            </a:r>
+            <a:endParaRPr kumimoji="0" lang="en-AU" altLang="en-US" sz="1000" b="0" i="0" u="none" strike="noStrike" cap="none" normalizeH="0" baseline="0" dirty="0">
+              <a:ln>
+                <a:noFill/>
+              </a:ln>
+              <a:solidFill>
+                <a:schemeClr val="tx1"/>
+              </a:solidFill>
+              <a:effectLst/>
+              <a:latin typeface="Arial" panose="020B0604020202020204" pitchFamily="34" charset="0"/>
+            </a:endParaRPr>
+          </a:p>
+          <a:p>
+            <a:pPr marL="0" marR="0" lvl="0" indent="0" algn="l" defTabSz="914400" rtl="0" eaLnBrk="0" fontAlgn="base" latinLnBrk="0" hangingPunct="0">
+              <a:lnSpc>
+                <a:spcPct val="100000"/>
+              </a:lnSpc>
+              <a:spcBef>
+                <a:spcPct val="0"/>
+              </a:spcBef>
+              <a:spcAft>
+                <a:spcPct val="0"/>
+              </a:spcAft>
+              <a:buClrTx/>
+              <a:buSzTx/>
+              <a:buFontTx/>
+              <a:buNone/>
+              <a:tabLst/>
+            </a:pPr>
+            <a:endParaRPr kumimoji="0" lang="en-AU" altLang="en-US" sz="1800" b="0" i="0" u="none" strike="noStrike" cap="none" normalizeH="0" baseline="0" dirty="0">
+              <a:ln>
+                <a:noFill/>
+              </a:ln>
+              <a:solidFill>
+                <a:schemeClr val="tx1"/>
+              </a:solidFill>
+              <a:effectLst/>
+              <a:latin typeface="Arial" panose="020B0604020202020204" pitchFamily="34" charset="0"/>
+            </a:endParaRPr>
+          </a:p>
+        </p:txBody>
+      </p:sp>
+      <p:sp>
+        <p:nvSpPr>
+          <p:cNvPr id="24" name="Line 16">
+            <a:extLst>
+              <a:ext uri="{FF2B5EF4-FFF2-40B4-BE49-F238E27FC236}">
+                <a16:creationId xmlns:a16="http://schemas.microsoft.com/office/drawing/2014/main" id="{A2FD2B9C-7655-0D40-94CE-142D8606D5E8}"/>
+              </a:ext>
+            </a:extLst>
+          </p:cNvPr>
+          <p:cNvSpPr>
+            <a:spLocks noChangeShapeType="1"/>
+          </p:cNvSpPr>
+          <p:nvPr/>
+        </p:nvSpPr>
+        <p:spPr bwMode="auto">
+          <a:xfrm flipH="1">
+            <a:off x="1543049" y="1839912"/>
+            <a:ext cx="9526" cy="1589088"/>
+          </a:xfrm>
+          <a:prstGeom prst="line">
+            <a:avLst/>
+          </a:prstGeom>
+          <a:noFill/>
+          <a:ln w="19050">
+            <a:solidFill>
+              <a:srgbClr val="000000"/>
+            </a:solidFill>
+            <a:round/>
+            <a:headEnd/>
+            <a:tailEnd/>
+          </a:ln>
+          <a:extLst>
+            <a:ext uri="{909E8E84-426E-40DD-AFC4-6F175D3DCCD1}">
+              <a14:hiddenFill xmlns:a14="http://schemas.microsoft.com/office/drawing/2010/main">
+                <a:noFill/>
+              </a14:hiddenFill>
+            </a:ext>
+          </a:extLst>
+        </p:spPr>
+        <p:txBody>
+          <a:bodyPr vert="horz" wrap="square" lIns="91440" tIns="45720" rIns="91440" bIns="45720" numCol="1" anchor="t" anchorCtr="0" compatLnSpc="1">
+            <a:prstTxWarp prst="textNoShape">
+              <a:avLst/>
+            </a:prstTxWarp>
+          </a:bodyPr>
+          <a:lstStyle/>
+          <a:p>
+            <a:endParaRPr lang="en-US"/>
+          </a:p>
+        </p:txBody>
+      </p:sp>
+      <p:sp>
+        <p:nvSpPr>
+          <p:cNvPr id="25" name="Line 16">
+            <a:extLst>
+              <a:ext uri="{FF2B5EF4-FFF2-40B4-BE49-F238E27FC236}">
+                <a16:creationId xmlns:a16="http://schemas.microsoft.com/office/drawing/2014/main" id="{1304C15D-C6C6-4045-98B5-4DBD8335E128}"/>
+              </a:ext>
+            </a:extLst>
+          </p:cNvPr>
+          <p:cNvSpPr>
+            <a:spLocks noChangeShapeType="1"/>
+          </p:cNvSpPr>
+          <p:nvPr/>
+        </p:nvSpPr>
+        <p:spPr bwMode="auto">
+          <a:xfrm flipH="1">
+            <a:off x="2016918" y="1860089"/>
+            <a:ext cx="9525" cy="1557338"/>
+          </a:xfrm>
+          <a:prstGeom prst="line">
+            <a:avLst/>
+          </a:prstGeom>
+          <a:noFill/>
+          <a:ln w="19050">
+            <a:solidFill>
+              <a:srgbClr val="000000"/>
+            </a:solidFill>
+            <a:round/>
+            <a:headEnd/>
+            <a:tailEnd/>
+          </a:ln>
+          <a:extLst>
+            <a:ext uri="{909E8E84-426E-40DD-AFC4-6F175D3DCCD1}">
+              <a14:hiddenFill xmlns:a14="http://schemas.microsoft.com/office/drawing/2010/main">
+                <a:noFill/>
+              </a14:hiddenFill>
+            </a:ext>
+          </a:extLst>
+        </p:spPr>
+        <p:txBody>
+          <a:bodyPr vert="horz" wrap="square" lIns="91440" tIns="45720" rIns="91440" bIns="45720" numCol="1" anchor="t" anchorCtr="0" compatLnSpc="1">
+            <a:prstTxWarp prst="textNoShape">
+              <a:avLst/>
+            </a:prstTxWarp>
+          </a:bodyPr>
+          <a:lstStyle/>
+          <a:p>
+            <a:endParaRPr lang="en-US"/>
+          </a:p>
+        </p:txBody>
+      </p:sp>
+      <p:sp>
+        <p:nvSpPr>
+          <p:cNvPr id="26" name="Rectangle 15">
+            <a:extLst>
+              <a:ext uri="{FF2B5EF4-FFF2-40B4-BE49-F238E27FC236}">
+                <a16:creationId xmlns:a16="http://schemas.microsoft.com/office/drawing/2014/main" id="{9BCB2157-7333-5542-886E-17CF6D355CAC}"/>
+              </a:ext>
+            </a:extLst>
+          </p:cNvPr>
+          <p:cNvSpPr>
+            <a:spLocks noChangeArrowheads="1"/>
+          </p:cNvSpPr>
+          <p:nvPr/>
+        </p:nvSpPr>
+        <p:spPr bwMode="auto">
+          <a:xfrm>
+            <a:off x="2021680" y="2416177"/>
+            <a:ext cx="2147887" cy="813594"/>
+          </a:xfrm>
+          <a:prstGeom prst="rect">
+            <a:avLst/>
+          </a:prstGeom>
+          <a:noFill/>
+          <a:ln>
+            <a:noFill/>
+          </a:ln>
+          <a:extLst>
+            <a:ext uri="{909E8E84-426E-40DD-AFC4-6F175D3DCCD1}">
+              <a14:hiddenFill xmlns:a14="http://schemas.microsoft.com/office/drawing/2010/main">
+                <a:solidFill>
+                  <a:srgbClr val="FFFFFF"/>
+                </a:solidFill>
+              </a14:hiddenFill>
+            </a:ext>
+            <a:ext uri="{91240B29-F687-4F45-9708-019B960494DF}">
+              <a14:hiddenLine xmlns:a14="http://schemas.microsoft.com/office/drawing/2010/main" w="0">
+                <a:solidFill>
+                  <a:srgbClr val="000000"/>
+                </a:solidFill>
+                <a:miter lim="800000"/>
+                <a:headEnd/>
+                <a:tailEnd/>
+              </a14:hiddenLine>
+            </a:ext>
+          </a:extLst>
+        </p:spPr>
+        <p:txBody>
+          <a:bodyPr vert="horz" wrap="square" lIns="91440" tIns="45720" rIns="91440" bIns="45720" numCol="1" anchor="t" anchorCtr="0" compatLnSpc="1">
+            <a:prstTxWarp prst="textNoShape">
+              <a:avLst/>
+            </a:prstTxWarp>
+          </a:bodyPr>
+          <a:lstStyle/>
+          <a:p>
+            <a:pPr marL="0" marR="0" lvl="0" indent="0" algn="l" defTabSz="914400" rtl="0" eaLnBrk="0" fontAlgn="base" latinLnBrk="0" hangingPunct="0">
+              <a:lnSpc>
+                <a:spcPct val="100000"/>
+              </a:lnSpc>
+              <a:spcBef>
+                <a:spcPct val="0"/>
+              </a:spcBef>
+              <a:spcAft>
+                <a:spcPct val="0"/>
+              </a:spcAft>
+              <a:buClrTx/>
+              <a:buSzTx/>
+              <a:buFontTx/>
+              <a:buNone/>
+              <a:tabLst/>
+            </a:pPr>
+            <a:r>
+              <a:rPr kumimoji="0" lang="en-AU" altLang="en-US" sz="1000" b="0" i="0" u="none" strike="noStrike" cap="none" normalizeH="0" baseline="0" dirty="0">
+                <a:ln>
+                  <a:noFill/>
+                </a:ln>
+                <a:solidFill>
+                  <a:schemeClr val="tx1"/>
+                </a:solidFill>
+                <a:effectLst/>
+                <a:latin typeface="Times New Roman" panose="02020603050405020304" pitchFamily="18" charset="0"/>
+                <a:ea typeface="Times New Roman" panose="02020603050405020304" pitchFamily="18" charset="0"/>
+                <a:cs typeface="Times New Roman" panose="02020603050405020304" pitchFamily="18" charset="0"/>
+              </a:rPr>
+              <a:t>Retrieve Clarifications</a:t>
+            </a:r>
+          </a:p>
+          <a:p>
+            <a:pPr marL="0" marR="0" lvl="0" indent="0" algn="l" defTabSz="914400" rtl="0" eaLnBrk="0" fontAlgn="base" latinLnBrk="0" hangingPunct="0">
+              <a:lnSpc>
+                <a:spcPct val="100000"/>
+              </a:lnSpc>
+              <a:spcBef>
+                <a:spcPct val="0"/>
+              </a:spcBef>
+              <a:spcAft>
+                <a:spcPct val="0"/>
+              </a:spcAft>
+              <a:buClrTx/>
+              <a:buSzTx/>
+              <a:buFontTx/>
+              <a:buNone/>
+              <a:tabLst/>
+            </a:pPr>
+            <a:r>
+              <a:rPr kumimoji="0" lang="en-AU" altLang="en-US" sz="1000" b="0" i="0" u="none" strike="noStrike" cap="none" normalizeH="0" baseline="0" dirty="0">
+                <a:ln>
+                  <a:noFill/>
+                </a:ln>
+                <a:solidFill>
+                  <a:schemeClr val="tx1"/>
+                </a:solidFill>
+                <a:effectLst/>
+                <a:latin typeface="Times New Roman" panose="02020603050405020304" pitchFamily="18" charset="0"/>
+                <a:ea typeface="Times New Roman" panose="02020603050405020304" pitchFamily="18" charset="0"/>
+                <a:cs typeface="Times New Roman" panose="02020603050405020304" pitchFamily="18" charset="0"/>
+              </a:rPr>
+              <a:t>[ITI-37] </a:t>
+            </a:r>
+            <a:endParaRPr kumimoji="0" lang="en-AU" altLang="en-US" sz="1000" b="0" i="0" u="none" strike="noStrike" cap="none" normalizeH="0" baseline="0" dirty="0">
+              <a:ln>
+                <a:noFill/>
+              </a:ln>
+              <a:solidFill>
+                <a:schemeClr val="tx1"/>
+              </a:solidFill>
+              <a:effectLst/>
+              <a:latin typeface="Times New Roman" panose="02020603050405020304" pitchFamily="18" charset="0"/>
+              <a:cs typeface="Times New Roman" panose="02020603050405020304" pitchFamily="18" charset="0"/>
+            </a:endParaRPr>
+          </a:p>
+          <a:p>
+            <a:pPr marL="0" marR="0" lvl="0" indent="0" algn="l" defTabSz="914400" rtl="0" eaLnBrk="0" fontAlgn="base" latinLnBrk="0" hangingPunct="0">
+              <a:lnSpc>
+                <a:spcPct val="100000"/>
+              </a:lnSpc>
+              <a:spcBef>
+                <a:spcPct val="0"/>
+              </a:spcBef>
+              <a:spcAft>
+                <a:spcPct val="0"/>
+              </a:spcAft>
+              <a:buClrTx/>
+              <a:buSzTx/>
+              <a:buFontTx/>
+              <a:buNone/>
+              <a:tabLst/>
+            </a:pPr>
+            <a:r>
+              <a:rPr kumimoji="0" lang="en-AU" altLang="en-US" sz="1000" b="0" i="0" u="none" strike="noStrike" cap="none" normalizeH="0" baseline="0" dirty="0">
+                <a:ln>
+                  <a:noFill/>
+                </a:ln>
+                <a:solidFill>
+                  <a:schemeClr val="tx1"/>
+                </a:solidFill>
+                <a:effectLst/>
+                <a:latin typeface="Times New Roman" panose="02020603050405020304" pitchFamily="18" charset="0"/>
+                <a:ea typeface="Times New Roman" panose="02020603050405020304" pitchFamily="18" charset="0"/>
+                <a:sym typeface="Symbol" pitchFamily="2" charset="2"/>
+              </a:rPr>
+              <a:t></a:t>
+            </a:r>
+          </a:p>
+        </p:txBody>
+      </p:sp>
+      <p:sp>
+        <p:nvSpPr>
+          <p:cNvPr id="27" name="Rectangle 15">
+            <a:extLst>
+              <a:ext uri="{FF2B5EF4-FFF2-40B4-BE49-F238E27FC236}">
+                <a16:creationId xmlns:a16="http://schemas.microsoft.com/office/drawing/2014/main" id="{0EE04783-B891-6A43-BBEE-2B8F82D73181}"/>
+              </a:ext>
+            </a:extLst>
+          </p:cNvPr>
+          <p:cNvSpPr>
+            <a:spLocks noChangeArrowheads="1"/>
+          </p:cNvSpPr>
+          <p:nvPr/>
+        </p:nvSpPr>
+        <p:spPr bwMode="auto">
+          <a:xfrm>
+            <a:off x="3540942" y="2141604"/>
+            <a:ext cx="2106612" cy="764382"/>
+          </a:xfrm>
+          <a:prstGeom prst="rect">
+            <a:avLst/>
+          </a:prstGeom>
+          <a:noFill/>
+          <a:ln>
+            <a:noFill/>
+          </a:ln>
+          <a:extLst>
+            <a:ext uri="{909E8E84-426E-40DD-AFC4-6F175D3DCCD1}">
+              <a14:hiddenFill xmlns:a14="http://schemas.microsoft.com/office/drawing/2010/main">
+                <a:solidFill>
+                  <a:srgbClr val="FFFFFF"/>
+                </a:solidFill>
+              </a14:hiddenFill>
+            </a:ext>
+            <a:ext uri="{91240B29-F687-4F45-9708-019B960494DF}">
+              <a14:hiddenLine xmlns:a14="http://schemas.microsoft.com/office/drawing/2010/main" w="0">
+                <a:solidFill>
+                  <a:srgbClr val="000000"/>
+                </a:solidFill>
+                <a:miter lim="800000"/>
+                <a:headEnd/>
+                <a:tailEnd/>
+              </a14:hiddenLine>
+            </a:ext>
+          </a:extLst>
+        </p:spPr>
+        <p:txBody>
+          <a:bodyPr vert="horz" wrap="square" lIns="91440" tIns="45720" rIns="91440" bIns="45720" numCol="1" anchor="t" anchorCtr="0" compatLnSpc="1">
+            <a:prstTxWarp prst="textNoShape">
+              <a:avLst/>
+            </a:prstTxWarp>
+          </a:bodyPr>
+          <a:lstStyle/>
+          <a:p>
+            <a:pPr marL="0" marR="0" lvl="0" indent="0" defTabSz="914400" rtl="0" eaLnBrk="0" fontAlgn="base" latinLnBrk="0" hangingPunct="0">
+              <a:lnSpc>
+                <a:spcPct val="100000"/>
+              </a:lnSpc>
+              <a:spcBef>
+                <a:spcPct val="0"/>
+              </a:spcBef>
+              <a:spcAft>
+                <a:spcPct val="0"/>
+              </a:spcAft>
+              <a:buClrTx/>
+              <a:buSzTx/>
+              <a:buFontTx/>
+              <a:buNone/>
+              <a:tabLst/>
+            </a:pPr>
+            <a:r>
+              <a:rPr lang="en-AU" altLang="en-US" sz="1000" dirty="0">
+                <a:latin typeface="Times New Roman" panose="02020603050405020304" pitchFamily="18" charset="0"/>
+                <a:ea typeface="Times New Roman" panose="02020603050405020304" pitchFamily="18" charset="0"/>
+                <a:cs typeface="Times New Roman" panose="02020603050405020304" pitchFamily="18" charset="0"/>
+              </a:rPr>
+              <a:t>Submit</a:t>
+            </a:r>
+            <a:r>
+              <a:rPr kumimoji="0" lang="en-AU" altLang="en-US" sz="1000" b="0" i="0" u="none" strike="noStrike" cap="none" normalizeH="0" baseline="0" dirty="0">
+                <a:ln>
+                  <a:noFill/>
+                </a:ln>
+                <a:solidFill>
+                  <a:schemeClr val="tx1"/>
+                </a:solidFill>
+                <a:effectLst/>
+                <a:latin typeface="Times New Roman" panose="02020603050405020304" pitchFamily="18" charset="0"/>
+                <a:ea typeface="Times New Roman" panose="02020603050405020304" pitchFamily="18" charset="0"/>
+                <a:cs typeface="Times New Roman" panose="02020603050405020304" pitchFamily="18" charset="0"/>
+              </a:rPr>
+              <a:t> Form </a:t>
+            </a:r>
+          </a:p>
+          <a:p>
+            <a:pPr marL="0" marR="0" lvl="0" indent="0" defTabSz="914400" rtl="0" eaLnBrk="0" fontAlgn="base" latinLnBrk="0" hangingPunct="0">
+              <a:lnSpc>
+                <a:spcPct val="100000"/>
+              </a:lnSpc>
+              <a:spcBef>
+                <a:spcPct val="0"/>
+              </a:spcBef>
+              <a:spcAft>
+                <a:spcPct val="0"/>
+              </a:spcAft>
+              <a:buClrTx/>
+              <a:buSzTx/>
+              <a:buFontTx/>
+              <a:buNone/>
+              <a:tabLst/>
+            </a:pPr>
+            <a:r>
+              <a:rPr kumimoji="0" lang="en-AU" altLang="en-US" sz="1000" b="0" i="0" u="none" strike="noStrike" cap="none" normalizeH="0" baseline="0" dirty="0">
+                <a:ln>
+                  <a:noFill/>
+                </a:ln>
+                <a:solidFill>
+                  <a:schemeClr val="tx1"/>
+                </a:solidFill>
+                <a:effectLst/>
+                <a:latin typeface="Times New Roman" panose="02020603050405020304" pitchFamily="18" charset="0"/>
+                <a:ea typeface="Times New Roman" panose="02020603050405020304" pitchFamily="18" charset="0"/>
+                <a:cs typeface="Times New Roman" panose="02020603050405020304" pitchFamily="18" charset="0"/>
+              </a:rPr>
+              <a:t>[ITI-35] </a:t>
+            </a:r>
+            <a:endParaRPr kumimoji="0" lang="en-AU" altLang="en-US" sz="1000" b="0" i="0" u="none" strike="noStrike" cap="none" normalizeH="0" baseline="0" dirty="0">
+              <a:ln>
+                <a:noFill/>
+              </a:ln>
+              <a:solidFill>
+                <a:schemeClr val="tx1"/>
+              </a:solidFill>
+              <a:effectLst/>
+              <a:latin typeface="Times New Roman" panose="02020603050405020304" pitchFamily="18" charset="0"/>
+              <a:cs typeface="Times New Roman" panose="02020603050405020304" pitchFamily="18" charset="0"/>
+            </a:endParaRPr>
+          </a:p>
+          <a:p>
+            <a:pPr marL="0" marR="0" lvl="0" indent="0" defTabSz="914400" rtl="0" eaLnBrk="0" fontAlgn="base" latinLnBrk="0" hangingPunct="0">
+              <a:lnSpc>
+                <a:spcPct val="100000"/>
+              </a:lnSpc>
+              <a:spcBef>
+                <a:spcPct val="0"/>
+              </a:spcBef>
+              <a:spcAft>
+                <a:spcPct val="0"/>
+              </a:spcAft>
+              <a:buClrTx/>
+              <a:buSzTx/>
+              <a:buFontTx/>
+              <a:buNone/>
+              <a:tabLst/>
+            </a:pPr>
+            <a:r>
+              <a:rPr kumimoji="0" lang="en-AU" altLang="en-US" sz="1000" b="0" i="0" u="none" strike="noStrike" cap="none" normalizeH="0" baseline="0" dirty="0">
+                <a:ln>
+                  <a:noFill/>
+                </a:ln>
+                <a:solidFill>
+                  <a:schemeClr val="tx1"/>
+                </a:solidFill>
+                <a:effectLst/>
+                <a:latin typeface="Times New Roman" panose="02020603050405020304" pitchFamily="18" charset="0"/>
+                <a:ea typeface="Times New Roman" panose="02020603050405020304" pitchFamily="18" charset="0"/>
+                <a:sym typeface="Symbol" pitchFamily="2" charset="2"/>
+              </a:rPr>
+              <a:t></a:t>
+            </a:r>
+          </a:p>
+        </p:txBody>
+      </p:sp>
+      <p:sp>
+        <p:nvSpPr>
+          <p:cNvPr id="2" name="Rectangle 1">
+            <a:extLst>
+              <a:ext uri="{FF2B5EF4-FFF2-40B4-BE49-F238E27FC236}">
+                <a16:creationId xmlns:a16="http://schemas.microsoft.com/office/drawing/2014/main" id="{3A947169-F844-F34E-8EE3-25D43012065A}"/>
+              </a:ext>
+            </a:extLst>
+          </p:cNvPr>
+          <p:cNvSpPr/>
+          <p:nvPr/>
+        </p:nvSpPr>
+        <p:spPr>
+          <a:xfrm>
+            <a:off x="500358" y="3180560"/>
+            <a:ext cx="4456938" cy="936628"/>
+          </a:xfrm>
+          <a:prstGeom prst="rect">
+            <a:avLst/>
+          </a:prstGeom>
+          <a:noFill/>
+          <a:ln>
+            <a:solidFill>
+              <a:schemeClr val="tx1"/>
+            </a:solidFill>
+            <a:prstDash val="sysDash"/>
+          </a:ln>
+        </p:spPr>
+        <p:style>
+          <a:lnRef idx="2">
+            <a:schemeClr val="accent1">
+              <a:shade val="50000"/>
+            </a:schemeClr>
+          </a:lnRef>
+          <a:fillRef idx="1">
+            <a:schemeClr val="accent1"/>
+          </a:fillRef>
+          <a:effectRef idx="0">
+            <a:schemeClr val="accent1"/>
+          </a:effectRef>
+          <a:fontRef idx="minor">
+            <a:schemeClr val="lt1"/>
+          </a:fontRef>
+        </p:style>
+        <p:txBody>
+          <a:bodyPr rtlCol="0" anchor="ctr"/>
+          <a:lstStyle/>
+          <a:p>
+            <a:pPr algn="ctr"/>
+            <a:endParaRPr lang="en-US"/>
+          </a:p>
+        </p:txBody>
+      </p:sp>
+      <p:sp>
+        <p:nvSpPr>
+          <p:cNvPr id="3" name="TextBox 2">
+            <a:extLst>
+              <a:ext uri="{FF2B5EF4-FFF2-40B4-BE49-F238E27FC236}">
+                <a16:creationId xmlns:a16="http://schemas.microsoft.com/office/drawing/2014/main" id="{3F7C8D4C-9DE1-364B-93EB-18EFC55136D2}"/>
+              </a:ext>
+            </a:extLst>
+          </p:cNvPr>
+          <p:cNvSpPr txBox="1"/>
+          <p:nvPr/>
+        </p:nvSpPr>
+        <p:spPr>
+          <a:xfrm>
+            <a:off x="2199774" y="3182525"/>
+            <a:ext cx="995785" cy="246221"/>
+          </a:xfrm>
+          <a:prstGeom prst="rect">
+            <a:avLst/>
+          </a:prstGeom>
+          <a:noFill/>
+        </p:spPr>
+        <p:txBody>
+          <a:bodyPr wrap="none" rtlCol="0">
+            <a:spAutoFit/>
+          </a:bodyPr>
+          <a:lstStyle/>
+          <a:p>
+            <a:r>
+              <a:rPr lang="en-US" sz="1000" dirty="0"/>
+              <a:t>Form Processor</a:t>
+            </a:r>
           </a:p>
         </p:txBody>
       </p:sp>

</xml_diff>